<commit_message>
Added transitions and some formatting changes
</commit_message>
<xml_diff>
--- a/Documentation/Monster Assault.pptx
+++ b/Documentation/Monster Assault.pptx
@@ -2940,7 +2940,7 @@
           <a:p>
             <a:fld id="{935F9204-714C-4A6F-86C1-03B720F718A9}" type="datetimeFigureOut">
               <a:rPr lang="en-US" smtClean="0"/>
-              <a:t>10/25/2013</a:t>
+              <a:t>10/26/2013</a:t>
             </a:fld>
             <a:endParaRPr lang="en-US"/>
           </a:p>
@@ -3341,6 +3341,9 @@
   <p:clrMapOvr>
     <a:masterClrMapping/>
   </p:clrMapOvr>
+  <p:transition spd="slow">
+    <p:push/>
+  </p:transition>
 </p:sldLayout>
 </file>
 
@@ -3453,7 +3456,7 @@
           <a:p>
             <a:fld id="{935F9204-714C-4A6F-86C1-03B720F718A9}" type="datetimeFigureOut">
               <a:rPr lang="en-US" smtClean="0"/>
-              <a:t>10/25/2013</a:t>
+              <a:t>10/26/2013</a:t>
             </a:fld>
             <a:endParaRPr lang="en-US"/>
           </a:p>
@@ -3506,6 +3509,9 @@
   <p:clrMapOvr>
     <a:masterClrMapping/>
   </p:clrMapOvr>
+  <p:transition spd="slow">
+    <p:push/>
+  </p:transition>
 </p:sldLayout>
 </file>
 
@@ -3628,7 +3634,7 @@
           <a:p>
             <a:fld id="{935F9204-714C-4A6F-86C1-03B720F718A9}" type="datetimeFigureOut">
               <a:rPr lang="en-US" smtClean="0"/>
-              <a:t>10/25/2013</a:t>
+              <a:t>10/26/2013</a:t>
             </a:fld>
             <a:endParaRPr lang="en-US"/>
           </a:p>
@@ -3681,6 +3687,9 @@
   <p:clrMapOvr>
     <a:masterClrMapping/>
   </p:clrMapOvr>
+  <p:transition spd="slow">
+    <p:push/>
+  </p:transition>
 </p:sldLayout>
 </file>
 
@@ -3793,7 +3802,7 @@
           <a:p>
             <a:fld id="{935F9204-714C-4A6F-86C1-03B720F718A9}" type="datetimeFigureOut">
               <a:rPr lang="en-US" smtClean="0"/>
-              <a:t>10/25/2013</a:t>
+              <a:t>10/26/2013</a:t>
             </a:fld>
             <a:endParaRPr lang="en-US"/>
           </a:p>
@@ -3846,6 +3855,9 @@
   <p:clrMapOvr>
     <a:masterClrMapping/>
   </p:clrMapOvr>
+  <p:transition spd="slow">
+    <p:push/>
+  </p:transition>
 </p:sldLayout>
 </file>
 
@@ -6917,7 +6929,7 @@
           <a:p>
             <a:fld id="{935F9204-714C-4A6F-86C1-03B720F718A9}" type="datetimeFigureOut">
               <a:rPr lang="en-US" smtClean="0"/>
-              <a:t>10/25/2013</a:t>
+              <a:t>10/26/2013</a:t>
             </a:fld>
             <a:endParaRPr lang="en-US"/>
           </a:p>
@@ -6970,6 +6982,9 @@
   <p:clrMapOvr>
     <a:overrideClrMapping bg1="lt1" tx1="dk1" bg2="lt2" tx2="dk2" accent1="accent1" accent2="accent2" accent3="accent3" accent4="accent4" accent5="accent5" accent6="accent6" hlink="hlink" folHlink="folHlink"/>
   </p:clrMapOvr>
+  <p:transition spd="slow">
+    <p:push/>
+  </p:transition>
 </p:sldLayout>
 </file>
 
@@ -7200,7 +7215,7 @@
           <a:p>
             <a:fld id="{935F9204-714C-4A6F-86C1-03B720F718A9}" type="datetimeFigureOut">
               <a:rPr lang="en-US" smtClean="0"/>
-              <a:t>10/25/2013</a:t>
+              <a:t>10/26/2013</a:t>
             </a:fld>
             <a:endParaRPr lang="en-US"/>
           </a:p>
@@ -7253,6 +7268,9 @@
   <p:clrMapOvr>
     <a:masterClrMapping/>
   </p:clrMapOvr>
+  <p:transition spd="slow">
+    <p:push/>
+  </p:transition>
 </p:sldLayout>
 </file>
 
@@ -7617,7 +7635,7 @@
           <a:p>
             <a:fld id="{935F9204-714C-4A6F-86C1-03B720F718A9}" type="datetimeFigureOut">
               <a:rPr lang="en-US" smtClean="0"/>
-              <a:t>10/25/2013</a:t>
+              <a:t>10/26/2013</a:t>
             </a:fld>
             <a:endParaRPr lang="en-US"/>
           </a:p>
@@ -7670,6 +7688,9 @@
   <p:clrMapOvr>
     <a:masterClrMapping/>
   </p:clrMapOvr>
+  <p:transition spd="slow">
+    <p:push/>
+  </p:transition>
 </p:sldLayout>
 </file>
 
@@ -7730,7 +7751,7 @@
           <a:p>
             <a:fld id="{935F9204-714C-4A6F-86C1-03B720F718A9}" type="datetimeFigureOut">
               <a:rPr lang="en-US" smtClean="0"/>
-              <a:t>10/25/2013</a:t>
+              <a:t>10/26/2013</a:t>
             </a:fld>
             <a:endParaRPr lang="en-US"/>
           </a:p>
@@ -7783,6 +7804,9 @@
   <p:clrMapOvr>
     <a:masterClrMapping/>
   </p:clrMapOvr>
+  <p:transition spd="slow">
+    <p:push/>
+  </p:transition>
 </p:sldLayout>
 </file>
 
@@ -7820,7 +7844,7 @@
           <a:p>
             <a:fld id="{935F9204-714C-4A6F-86C1-03B720F718A9}" type="datetimeFigureOut">
               <a:rPr lang="en-US" smtClean="0"/>
-              <a:t>10/25/2013</a:t>
+              <a:t>10/26/2013</a:t>
             </a:fld>
             <a:endParaRPr lang="en-US"/>
           </a:p>
@@ -7873,6 +7897,9 @@
   <p:clrMapOvr>
     <a:masterClrMapping/>
   </p:clrMapOvr>
+  <p:transition spd="slow">
+    <p:push/>
+  </p:transition>
 </p:sldLayout>
 </file>
 
@@ -7995,7 +8022,7 @@
           <a:p>
             <a:fld id="{935F9204-714C-4A6F-86C1-03B720F718A9}" type="datetimeFigureOut">
               <a:rPr lang="en-US" smtClean="0"/>
-              <a:t>10/25/2013</a:t>
+              <a:t>10/26/2013</a:t>
             </a:fld>
             <a:endParaRPr lang="en-US"/>
           </a:p>
@@ -8351,6 +8378,9 @@
   <p:clrMapOvr>
     <a:masterClrMapping/>
   </p:clrMapOvr>
+  <p:transition spd="slow">
+    <p:push/>
+  </p:transition>
 </p:sldLayout>
 </file>
 
@@ -8481,7 +8511,7 @@
           <a:p>
             <a:fld id="{935F9204-714C-4A6F-86C1-03B720F718A9}" type="datetimeFigureOut">
               <a:rPr lang="en-US" smtClean="0"/>
-              <a:t>10/25/2013</a:t>
+              <a:t>10/26/2013</a:t>
             </a:fld>
             <a:endParaRPr lang="en-US"/>
           </a:p>
@@ -8827,6 +8857,9 @@
   <p:clrMapOvr>
     <a:masterClrMapping/>
   </p:clrMapOvr>
+  <p:transition spd="slow">
+    <p:push/>
+  </p:transition>
 </p:sldLayout>
 </file>
 
@@ -9033,7 +9066,7 @@
           <a:p>
             <a:fld id="{935F9204-714C-4A6F-86C1-03B720F718A9}" type="datetimeFigureOut">
               <a:rPr lang="en-US" smtClean="0"/>
-              <a:t>10/25/2013</a:t>
+              <a:t>10/26/2013</a:t>
             </a:fld>
             <a:endParaRPr lang="en-US"/>
           </a:p>
@@ -9129,6 +9162,9 @@
     <p:sldLayoutId id="2147483670" r:id="rId10"/>
     <p:sldLayoutId id="2147483671" r:id="rId11"/>
   </p:sldLayoutIdLst>
+  <p:transition spd="slow">
+    <p:push/>
+  </p:transition>
   <p:txStyles>
     <p:titleStyle>
       <a:lvl1pPr algn="l" defTabSz="914400" rtl="0" eaLnBrk="1" latinLnBrk="0" hangingPunct="1">
@@ -9465,7 +9501,7 @@
           <a:p>
             <a:r>
               <a:rPr lang="en-US" sz="5400" dirty="0" smtClean="0"/>
-              <a:t>Monster Assault</a:t>
+              <a:t>MONSTER ASSAULT</a:t>
             </a:r>
             <a:endParaRPr lang="en-US" sz="5400" dirty="0"/>
           </a:p>
@@ -9489,68 +9525,20 @@
           <a:lstStyle/>
           <a:p>
             <a:r>
-              <a:rPr lang="en-US" dirty="0" err="1" smtClean="0"/>
-              <a:t>Mayank</a:t>
-            </a:r>
-            <a:r>
               <a:rPr lang="en-US" dirty="0" smtClean="0"/>
-              <a:t> K </a:t>
-            </a:r>
-            <a:r>
-              <a:rPr lang="en-US" dirty="0" err="1" smtClean="0"/>
-              <a:t>Rastogi</a:t>
-            </a:r>
+              <a:t>MAYANK K RASTOGI (1005083)</a:t>
+            </a:r>
+          </a:p>
+          <a:p>
             <a:r>
               <a:rPr lang="en-US" dirty="0" smtClean="0"/>
-              <a:t> (</a:t>
-            </a:r>
+              <a:t>ARSHYA PANY (1005032)</a:t>
+            </a:r>
+          </a:p>
+          <a:p>
             <a:r>
               <a:rPr lang="en-US" dirty="0" smtClean="0"/>
-              <a:t>1005083)</a:t>
-            </a:r>
-          </a:p>
-          <a:p>
-            <a:r>
-              <a:rPr lang="en-US" dirty="0" err="1" smtClean="0"/>
-              <a:t>Arshya</a:t>
-            </a:r>
-            <a:r>
-              <a:rPr lang="en-US" dirty="0" smtClean="0"/>
-              <a:t> </a:t>
-            </a:r>
-            <a:r>
-              <a:rPr lang="en-US" dirty="0" err="1" smtClean="0"/>
-              <a:t>Pany</a:t>
-            </a:r>
-            <a:r>
-              <a:rPr lang="en-US" dirty="0" smtClean="0"/>
-              <a:t> (</a:t>
-            </a:r>
-            <a:r>
-              <a:rPr lang="en-US" dirty="0" smtClean="0"/>
-              <a:t>1005032)</a:t>
-            </a:r>
-          </a:p>
-          <a:p>
-            <a:r>
-              <a:rPr lang="en-US" dirty="0" err="1" smtClean="0"/>
-              <a:t>Shilpi</a:t>
-            </a:r>
-            <a:r>
-              <a:rPr lang="en-US" dirty="0" smtClean="0"/>
-              <a:t> </a:t>
-            </a:r>
-            <a:r>
-              <a:rPr lang="en-US" dirty="0" err="1" smtClean="0"/>
-              <a:t>Kumari</a:t>
-            </a:r>
-            <a:r>
-              <a:rPr lang="en-US" dirty="0" smtClean="0"/>
-              <a:t> (</a:t>
-            </a:r>
-            <a:r>
-              <a:rPr lang="en-US" dirty="0" smtClean="0"/>
-              <a:t>1005274)</a:t>
+              <a:t>SHILPI KUMARI (1005274)</a:t>
             </a:r>
             <a:endParaRPr lang="en-US" dirty="0"/>
           </a:p>
@@ -9561,6 +9549,18 @@
   <p:clrMapOvr>
     <a:masterClrMapping/>
   </p:clrMapOvr>
+  <mc:AlternateContent xmlns:mc="http://schemas.openxmlformats.org/markup-compatibility/2006">
+    <mc:Choice xmlns:p14="http://schemas.microsoft.com/office/powerpoint/2010/main" Requires="p14">
+      <p:transition spd="slow" p14:dur="3000">
+        <p14:shred/>
+      </p:transition>
+    </mc:Choice>
+    <mc:Fallback>
+      <p:transition spd="slow">
+        <p:fade/>
+      </p:transition>
+    </mc:Fallback>
+  </mc:AlternateContent>
   <p:timing>
     <p:tnLst>
       <p:par>
@@ -9677,6 +9677,9 @@
   <p:clrMapOvr>
     <a:masterClrMapping/>
   </p:clrMapOvr>
+  <p:transition spd="slow">
+    <p:push/>
+  </p:transition>
   <p:timing>
     <p:tnLst>
       <p:par>
@@ -9839,7 +9842,11 @@
             </a:pPr>
             <a:r>
               <a:rPr lang="en-IN" sz="2400" dirty="0" smtClean="0"/>
-              <a:t> It offers </a:t>
+              <a:t>It </a:t>
+            </a:r>
+            <a:r>
+              <a:rPr lang="en-IN" sz="2400" dirty="0" smtClean="0"/>
+              <a:t>offers </a:t>
             </a:r>
             <a:r>
               <a:rPr lang="en-IN" sz="2400" dirty="0"/>
@@ -9876,6 +9883,9 @@
   <p:clrMapOvr>
     <a:masterClrMapping/>
   </p:clrMapOvr>
+  <p:transition spd="slow">
+    <p:push/>
+  </p:transition>
   <p:timing>
     <p:tnLst>
       <p:par>
@@ -9938,6 +9948,9 @@
   <p:clrMapOvr>
     <a:masterClrMapping/>
   </p:clrMapOvr>
+  <p:transition spd="slow">
+    <p:push/>
+  </p:transition>
   <p:timing>
     <p:tnLst>
       <p:par>
@@ -10006,7 +10019,7 @@
           </a:bodyPr>
           <a:lstStyle/>
           <a:p>
-            <a:pPr algn="l">
+            <a:pPr>
               <a:buFont typeface="Arial" pitchFamily="34" charset="0"/>
               <a:buChar char="•"/>
             </a:pPr>
@@ -10020,7 +10033,7 @@
             </a:r>
           </a:p>
           <a:p>
-            <a:pPr algn="l">
+            <a:pPr>
               <a:buFont typeface="Arial" pitchFamily="34" charset="0"/>
               <a:buChar char="•"/>
             </a:pPr>
@@ -10047,7 +10060,7 @@
             </a:endParaRPr>
           </a:p>
           <a:p>
-            <a:pPr algn="l">
+            <a:pPr>
               <a:buFont typeface="Arial" pitchFamily="34" charset="0"/>
               <a:buChar char="•"/>
             </a:pPr>
@@ -10083,8 +10096,8 @@
         </p:blipFill>
         <p:spPr>
           <a:xfrm>
-            <a:off x="2590800" y="457200"/>
-            <a:ext cx="3581400" cy="2175701"/>
+            <a:off x="2895600" y="600265"/>
+            <a:ext cx="3276600" cy="1990535"/>
           </a:xfrm>
           <a:prstGeom prst="rect">
             <a:avLst/>
@@ -10096,6 +10109,9 @@
   <p:clrMapOvr>
     <a:masterClrMapping/>
   </p:clrMapOvr>
+  <p:transition spd="slow">
+    <p:push/>
+  </p:transition>
   <p:timing>
     <p:tnLst>
       <p:par>
@@ -10191,6 +10207,9 @@
   <p:clrMapOvr>
     <a:masterClrMapping/>
   </p:clrMapOvr>
+  <p:transition spd="slow">
+    <p:push dir="u"/>
+  </p:transition>
   <p:timing>
     <p:tnLst>
       <p:par>
@@ -10292,6 +10311,9 @@
   <p:clrMapOvr>
     <a:masterClrMapping/>
   </p:clrMapOvr>
+  <p:transition spd="slow">
+    <p:push/>
+  </p:transition>
   <p:timing>
     <p:tnLst>
       <p:par>
@@ -10362,6 +10384,7 @@
           <a:bodyPr/>
           <a:lstStyle/>
           <a:p>
+            <a:pPr algn="just"/>
             <a:r>
               <a:rPr lang="en-US" dirty="0" smtClean="0"/>
               <a:t>The architecture </a:t>
@@ -10376,20 +10399,24 @@
             </a:r>
             <a:r>
               <a:rPr lang="en-US" dirty="0"/>
-              <a:t>development is the MVC (model-view-controller) pattern</a:t>
+              <a:t>development is the MVC (model-view-controller) </a:t>
             </a:r>
             <a:r>
               <a:rPr lang="en-US" dirty="0" smtClean="0"/>
-              <a:t>.</a:t>
-            </a:r>
-          </a:p>
-          <a:p>
+              <a:t>pattern</a:t>
+            </a:r>
+            <a:endParaRPr lang="en-US" dirty="0" smtClean="0"/>
+          </a:p>
+          <a:p>
+            <a:pPr algn="just"/>
             <a:r>
               <a:rPr lang="en-US" dirty="0"/>
-              <a:t>The main aim of the MVC architecture is to separate the business logic and application data from the presentation data to the user.</a:t>
-            </a:r>
-          </a:p>
-          <a:p>
+              <a:t>The main aim of the MVC architecture is to separate the business logic and application data from the presentation data to the </a:t>
+            </a:r>
+            <a:r>
+              <a:rPr lang="en-US" dirty="0" smtClean="0"/>
+              <a:t>user</a:t>
+            </a:r>
             <a:endParaRPr lang="en-US" dirty="0"/>
           </a:p>
         </p:txBody>
@@ -10399,6 +10426,9 @@
   <p:clrMapOvr>
     <a:masterClrMapping/>
   </p:clrMapOvr>
+  <p:transition spd="slow">
+    <p:push/>
+  </p:transition>
   <p:timing>
     <p:tnLst>
       <p:par>
@@ -10686,6 +10716,9 @@
   <p:clrMapOvr>
     <a:masterClrMapping/>
   </p:clrMapOvr>
+  <p:transition spd="slow">
+    <p:push/>
+  </p:transition>
   <p:timing>
     <p:tnLst>
       <p:par>
@@ -10763,6 +10796,9 @@
   <p:clrMapOvr>
     <a:masterClrMapping/>
   </p:clrMapOvr>
+  <p:transition spd="slow">
+    <p:push dir="u"/>
+  </p:transition>
   <p:timing>
     <p:tnLst>
       <p:par>
@@ -10883,6 +10919,9 @@
   <p:clrMapOvr>
     <a:masterClrMapping/>
   </p:clrMapOvr>
+  <p:transition spd="slow">
+    <p:push/>
+  </p:transition>
   <p:timing>
     <p:tnLst>
       <p:par>
@@ -10964,53 +11003,68 @@
           <a:bodyPr/>
           <a:lstStyle/>
           <a:p>
+            <a:pPr algn="just"/>
             <a:r>
               <a:rPr lang="en-US" dirty="0" smtClean="0"/>
               <a:t>Monster Assault </a:t>
             </a:r>
             <a:r>
               <a:rPr lang="en-US" dirty="0"/>
-              <a:t>is a 2D-platformer android and desktop game written in JAVA</a:t>
+              <a:t>is a 2D-platformer android and desktop game written in </a:t>
             </a:r>
             <a:r>
               <a:rPr lang="en-US" dirty="0" smtClean="0"/>
-              <a:t>.</a:t>
-            </a:r>
-          </a:p>
-          <a:p>
+              <a:t>JAVA</a:t>
+            </a:r>
+            <a:endParaRPr lang="en-US" dirty="0" smtClean="0"/>
+          </a:p>
+          <a:p>
+            <a:pPr algn="just"/>
             <a:r>
               <a:rPr lang="en-US" dirty="0" smtClean="0"/>
               <a:t>It </a:t>
             </a:r>
             <a:r>
               <a:rPr lang="en-US" dirty="0"/>
-              <a:t>is a simple game where the user is required to move the character 'Bob' using arrow keys or the on-screen touchpad. </a:t>
+              <a:t>is a simple game where the user is required to move the character 'Bob' using arrow keys or the on-screen </a:t>
+            </a:r>
+            <a:r>
+              <a:rPr lang="en-US" dirty="0" smtClean="0"/>
+              <a:t>touchpad</a:t>
             </a:r>
             <a:endParaRPr lang="en-US" dirty="0" smtClean="0"/>
           </a:p>
           <a:p>
+            <a:pPr algn="just"/>
             <a:r>
               <a:rPr lang="en-US" dirty="0" smtClean="0"/>
               <a:t>Bob </a:t>
             </a:r>
             <a:r>
               <a:rPr lang="en-US" dirty="0"/>
-              <a:t>can jump and fire to dodge hurdles and kill monsters which gain him points</a:t>
+              <a:t>can jump and fire to dodge hurdles and kill monsters which gain him </a:t>
             </a:r>
             <a:r>
               <a:rPr lang="en-US" dirty="0" smtClean="0"/>
-              <a:t>.</a:t>
-            </a:r>
-          </a:p>
-          <a:p>
+              <a:t>points</a:t>
+            </a:r>
+            <a:endParaRPr lang="en-US" dirty="0" smtClean="0"/>
+          </a:p>
+          <a:p>
+            <a:pPr algn="just"/>
             <a:r>
               <a:rPr lang="en-US" dirty="0" smtClean="0"/>
               <a:t>Completing </a:t>
             </a:r>
             <a:r>
               <a:rPr lang="en-US" dirty="0"/>
-              <a:t>one level takes him to the next.</a:t>
-            </a:r>
+              <a:t>one level takes him to the </a:t>
+            </a:r>
+            <a:r>
+              <a:rPr lang="en-US" dirty="0" smtClean="0"/>
+              <a:t>next</a:t>
+            </a:r>
+            <a:endParaRPr lang="en-US" dirty="0"/>
           </a:p>
         </p:txBody>
       </p:sp>
@@ -11019,6 +11073,9 @@
   <p:clrMapOvr>
     <a:masterClrMapping/>
   </p:clrMapOvr>
+  <p:transition spd="slow">
+    <p:push dir="u"/>
+  </p:transition>
   <p:timing>
     <p:tnLst>
       <p:par>
@@ -11135,6 +11192,9 @@
   <p:clrMapOvr>
     <a:masterClrMapping/>
   </p:clrMapOvr>
+  <p:transition spd="slow">
+    <p:push/>
+  </p:transition>
   <p:timing>
     <p:tnLst>
       <p:par>
@@ -11251,6 +11311,9 @@
   <p:clrMapOvr>
     <a:masterClrMapping/>
   </p:clrMapOvr>
+  <p:transition spd="slow">
+    <p:push/>
+  </p:transition>
   <p:timing>
     <p:tnLst>
       <p:par>
@@ -11369,6 +11432,9 @@
   <p:clrMapOvr>
     <a:masterClrMapping/>
   </p:clrMapOvr>
+  <p:transition spd="slow">
+    <p:push/>
+  </p:transition>
   <p:timing>
     <p:tnLst>
       <p:par>
@@ -11485,6 +11551,9 @@
   <p:clrMapOvr>
     <a:masterClrMapping/>
   </p:clrMapOvr>
+  <p:transition spd="slow">
+    <p:push/>
+  </p:transition>
   <p:timing>
     <p:tnLst>
       <p:par>
@@ -11615,6 +11684,9 @@
   <p:clrMapOvr>
     <a:masterClrMapping/>
   </p:clrMapOvr>
+  <p:transition spd="slow">
+    <p:push dir="u"/>
+  </p:transition>
   <p:timing>
     <p:tnLst>
       <p:par>
@@ -11784,6 +11856,9 @@
   <p:clrMapOvr>
     <a:masterClrMapping/>
   </p:clrMapOvr>
+  <p:transition spd="slow">
+    <p:push/>
+  </p:transition>
   <p:timing>
     <p:tnLst>
       <p:par>
@@ -11933,6 +12008,9 @@
   <p:clrMapOvr>
     <a:masterClrMapping/>
   </p:clrMapOvr>
+  <p:transition spd="slow">
+    <p:push/>
+  </p:transition>
   <p:timing>
     <p:tnLst>
       <p:par>
@@ -12010,6 +12088,9 @@
   <p:clrMapOvr>
     <a:masterClrMapping/>
   </p:clrMapOvr>
+  <p:transition spd="slow">
+    <p:push dir="u"/>
+  </p:transition>
   <p:timing>
     <p:tnLst>
       <p:par>
@@ -12104,6 +12185,9 @@
   <p:clrMapOvr>
     <a:masterClrMapping/>
   </p:clrMapOvr>
+  <p:transition spd="slow">
+    <p:push/>
+  </p:transition>
   <p:timing>
     <p:tnLst>
       <p:par>
@@ -12167,6 +12251,9 @@
   <p:clrMapOvr>
     <a:masterClrMapping/>
   </p:clrMapOvr>
+  <p:transition spd="slow">
+    <p:push/>
+  </p:transition>
   <p:timing>
     <p:tnLst>
       <p:par>
@@ -12234,8 +12321,13 @@
           <a:p>
             <a:r>
               <a:rPr lang="en-US" dirty="0" smtClean="0"/>
-              <a:t>Develop an android game that will entertain and hook everyone.</a:t>
-            </a:r>
+              <a:t>Develop an android game that will entertain and hook </a:t>
+            </a:r>
+            <a:r>
+              <a:rPr lang="en-US" dirty="0" smtClean="0"/>
+              <a:t>everyone</a:t>
+            </a:r>
+            <a:endParaRPr lang="en-US" dirty="0" smtClean="0"/>
           </a:p>
           <a:p>
             <a:r>
@@ -12275,6 +12367,9 @@
   <p:clrMapOvr>
     <a:masterClrMapping/>
   </p:clrMapOvr>
+  <p:transition spd="slow">
+    <p:push/>
+  </p:transition>
   <p:timing>
     <p:tnLst>
       <p:par>
@@ -12392,6 +12487,9 @@
   <p:clrMapOvr>
     <a:masterClrMapping/>
   </p:clrMapOvr>
+  <p:transition spd="slow">
+    <p:push/>
+  </p:transition>
   <p:timing>
     <p:tnLst>
       <p:par>
@@ -12421,7 +12519,7 @@
       </p:grpSpPr>
       <p:pic>
         <p:nvPicPr>
-          <p:cNvPr id="5" name="Picture Placeholder 4" descr="collision-position.png"/>
+          <p:cNvPr id="5" name="Picture Placeholder 4"/>
           <p:cNvPicPr>
             <a:picLocks noGrp="1" noChangeAspect="1"/>
           </p:cNvPicPr>
@@ -12430,7 +12528,13 @@
           </p:nvPr>
         </p:nvPicPr>
         <p:blipFill>
-          <a:blip r:embed="rId2" cstate="print"/>
+          <a:blip r:embed="rId2">
+            <a:extLst>
+              <a:ext uri="{28A0092B-C50C-407E-A947-70E740481C1C}">
+                <a14:useLocalDpi xmlns:a14="http://schemas.microsoft.com/office/drawing/2010/main" val="0"/>
+              </a:ext>
+            </a:extLst>
+          </a:blip>
           <a:stretch>
             <a:fillRect/>
           </a:stretch>
@@ -12438,7 +12542,7 @@
         <p:spPr>
           <a:xfrm>
             <a:off x="895350" y="1981200"/>
-            <a:ext cx="7429500" cy="3843338"/>
+            <a:ext cx="7429500" cy="3843337"/>
           </a:xfrm>
         </p:spPr>
       </p:pic>
@@ -12508,6 +12612,9 @@
   <p:clrMapOvr>
     <a:masterClrMapping/>
   </p:clrMapOvr>
+  <p:transition spd="slow">
+    <p:push/>
+  </p:transition>
   <p:timing>
     <p:tnLst>
       <p:par>
@@ -12625,6 +12732,9 @@
   <p:clrMapOvr>
     <a:masterClrMapping/>
   </p:clrMapOvr>
+  <p:transition spd="slow">
+    <p:push dir="u"/>
+  </p:transition>
   <p:timing>
     <p:tnLst>
       <p:par>
@@ -12702,6 +12812,9 @@
   <p:clrMapOvr>
     <a:masterClrMapping/>
   </p:clrMapOvr>
+  <p:transition spd="slow">
+    <p:push/>
+  </p:transition>
   <p:timing>
     <p:tnLst>
       <p:par>
@@ -12777,18 +12890,31 @@
           </a:bodyPr>
           <a:lstStyle/>
           <a:p>
+            <a:pPr algn="just"/>
             <a:r>
               <a:rPr lang="en-US" dirty="0" smtClean="0"/>
-              <a:t>Android is an open-source platform developed under the Open Handset Alliance to enable faster development of mobile applications and provision of services to the user.</a:t>
-            </a:r>
-          </a:p>
-          <a:p>
+              <a:t>Android is an open-source platform developed under the Open Handset Alliance to enable faster development of mobile applications and provision of services to the </a:t>
+            </a:r>
             <a:r>
               <a:rPr lang="en-US" dirty="0" smtClean="0"/>
-              <a:t>The Google Android operating system is growing more and more popular with each passing month and there are wide range of Android smart phones now available.</a:t>
-            </a:r>
-          </a:p>
-          <a:p>
+              <a:t>user</a:t>
+            </a:r>
+            <a:endParaRPr lang="en-US" dirty="0" smtClean="0"/>
+          </a:p>
+          <a:p>
+            <a:pPr algn="just"/>
+            <a:r>
+              <a:rPr lang="en-US" dirty="0" smtClean="0"/>
+              <a:t>The Google Android operating system is growing more and more popular with each passing month and there are wide range of Android smart phones now </a:t>
+            </a:r>
+            <a:r>
+              <a:rPr lang="en-US" dirty="0" smtClean="0"/>
+              <a:t>available</a:t>
+            </a:r>
+            <a:endParaRPr lang="en-US" dirty="0" smtClean="0"/>
+          </a:p>
+          <a:p>
+            <a:pPr algn="just"/>
             <a:r>
               <a:rPr lang="en-US" dirty="0" smtClean="0"/>
               <a:t>A large potential audience for </a:t>
@@ -12799,7 +12925,11 @@
             </a:r>
             <a:r>
               <a:rPr lang="en-US" dirty="0" smtClean="0"/>
-              <a:t>ndroid games and a genuine hunger for some quality releases in the Android Play Store make Android game development a very attractive prospect.</a:t>
+              <a:t>ndroid games and a genuine hunger for some quality releases in the Android Play Store make Android game development a very attractive </a:t>
+            </a:r>
+            <a:r>
+              <a:rPr lang="en-US" dirty="0" smtClean="0"/>
+              <a:t>prospect</a:t>
             </a:r>
             <a:endParaRPr lang="en-US" dirty="0"/>
           </a:p>
@@ -12810,6 +12940,9 @@
   <p:clrMapOvr>
     <a:masterClrMapping/>
   </p:clrMapOvr>
+  <p:transition spd="slow">
+    <p:push/>
+  </p:transition>
   <p:timing>
     <p:tnLst>
       <p:par>
@@ -12892,6 +13025,9 @@
   <p:clrMapOvr>
     <a:masterClrMapping/>
   </p:clrMapOvr>
+  <p:transition spd="slow">
+    <p:push dir="u"/>
+  </p:transition>
   <p:timing>
     <p:tnLst>
       <p:par>
@@ -13093,6 +13229,9 @@
   <p:clrMapOvr>
     <a:masterClrMapping/>
   </p:clrMapOvr>
+  <p:transition spd="slow">
+    <p:push/>
+  </p:transition>
   <p:timing>
     <p:tnLst>
       <p:par>
@@ -13165,8 +13304,8 @@
         </p:blipFill>
         <p:spPr>
           <a:xfrm>
-            <a:off x="381000" y="2438400"/>
-            <a:ext cx="3844480" cy="2362200"/>
+            <a:off x="489966" y="2438400"/>
+            <a:ext cx="3472434" cy="2133600"/>
           </a:xfrm>
         </p:spPr>
       </p:pic>
@@ -13178,8 +13317,8 @@
         </p:nvSpPr>
         <p:spPr>
           <a:xfrm>
-            <a:off x="4343400" y="1447800"/>
-            <a:ext cx="4038600" cy="5262979"/>
+            <a:off x="4191000" y="1483816"/>
+            <a:ext cx="4495800" cy="4154984"/>
           </a:xfrm>
           <a:prstGeom prst="rect">
             <a:avLst/>
@@ -13192,7 +13331,7 @@
           </a:bodyPr>
           <a:lstStyle/>
           <a:p>
-            <a:pPr>
+            <a:pPr algn="just">
               <a:buFont typeface="Arial" pitchFamily="34" charset="0"/>
               <a:buChar char="•"/>
             </a:pPr>
@@ -13224,13 +13363,9 @@
               </a:rPr>
               <a:t>language </a:t>
             </a:r>
-            <a:endParaRPr lang="en-IN" sz="2400" dirty="0" smtClean="0">
-              <a:latin typeface="Shruti" pitchFamily="34" charset="0"/>
-              <a:cs typeface="Shruti" pitchFamily="34" charset="0"/>
-            </a:endParaRPr>
-          </a:p>
-          <a:p>
-            <a:pPr>
+          </a:p>
+          <a:p>
+            <a:pPr algn="just">
               <a:buFont typeface="Arial" pitchFamily="34" charset="0"/>
               <a:buChar char="•"/>
             </a:pPr>
@@ -13240,7 +13375,7 @@
             </a:endParaRPr>
           </a:p>
           <a:p>
-            <a:pPr>
+            <a:pPr algn="just">
               <a:buFont typeface="Arial" pitchFamily="34" charset="0"/>
               <a:buChar char="•"/>
             </a:pPr>
@@ -13279,19 +13414,16 @@
               </a:rPr>
               <a:t>architecture</a:t>
             </a:r>
+          </a:p>
+          <a:p>
+            <a:pPr algn="just"/>
             <a:endParaRPr lang="en-IN" sz="2400" dirty="0" smtClean="0">
               <a:latin typeface="Shruti" pitchFamily="34" charset="0"/>
               <a:cs typeface="Shruti" pitchFamily="34" charset="0"/>
             </a:endParaRPr>
           </a:p>
           <a:p>
-            <a:endParaRPr lang="en-IN" sz="2400" dirty="0" smtClean="0">
-              <a:latin typeface="Shruti" pitchFamily="34" charset="0"/>
-              <a:cs typeface="Shruti" pitchFamily="34" charset="0"/>
-            </a:endParaRPr>
-          </a:p>
-          <a:p>
-            <a:pPr>
+            <a:pPr algn="just">
               <a:buFont typeface="Arial" pitchFamily="34" charset="0"/>
               <a:buChar char="•"/>
             </a:pPr>
@@ -13321,6 +13453,9 @@
   <p:clrMapOvr>
     <a:masterClrMapping/>
   </p:clrMapOvr>
+  <p:transition spd="slow">
+    <p:push/>
+  </p:transition>
   <p:timing>
     <p:tnLst>
       <p:par>
@@ -13389,7 +13524,7 @@
         </p:blipFill>
         <p:spPr>
           <a:xfrm>
-            <a:off x="380999" y="2667000"/>
+            <a:off x="554925" y="2667000"/>
             <a:ext cx="3178875" cy="1981200"/>
           </a:xfrm>
         </p:spPr>
@@ -13403,7 +13538,7 @@
         <p:spPr>
           <a:xfrm>
             <a:off x="4038600" y="1600200"/>
-            <a:ext cx="4800600" cy="4524315"/>
+            <a:ext cx="4648200" cy="4524315"/>
           </a:xfrm>
           <a:prstGeom prst="rect">
             <a:avLst/>
@@ -13416,37 +13551,22 @@
           </a:bodyPr>
           <a:lstStyle/>
           <a:p>
-            <a:pPr>
+            <a:pPr algn="just">
               <a:buFont typeface="Arial" pitchFamily="34" charset="0"/>
               <a:buChar char="•"/>
             </a:pPr>
             <a:r>
               <a:rPr lang="en-IN" sz="2400" dirty="0"/>
-              <a:t>Android is a Linux-based operating system designed primarily for </a:t>
-            </a:r>
-            <a:r>
-              <a:rPr lang="en-IN" sz="2400" dirty="0" err="1"/>
-              <a:t>touchscreen</a:t>
-            </a:r>
-            <a:r>
-              <a:rPr lang="en-IN" sz="2400" dirty="0"/>
-              <a:t> mobile devices such as </a:t>
-            </a:r>
-            <a:r>
-              <a:rPr lang="en-IN" sz="2400" dirty="0" err="1"/>
-              <a:t>smartphones</a:t>
-            </a:r>
-            <a:r>
-              <a:rPr lang="en-IN" sz="2400" dirty="0"/>
-              <a:t> and tablet computers</a:t>
+              <a:t>Android is a Linux-based operating system designed primarily for touchscreen mobile devices such as smartphones and tablet </a:t>
             </a:r>
             <a:r>
               <a:rPr lang="en-IN" sz="2400" dirty="0" smtClean="0"/>
-              <a:t>.</a:t>
-            </a:r>
-          </a:p>
-          <a:p>
-            <a:pPr>
+              <a:t>computers</a:t>
+            </a:r>
+            <a:endParaRPr lang="en-IN" sz="2400" dirty="0" smtClean="0"/>
+          </a:p>
+          <a:p>
+            <a:pPr algn="just">
               <a:buFont typeface="Arial" pitchFamily="34" charset="0"/>
               <a:buChar char="•"/>
             </a:pPr>
@@ -13456,26 +13576,31 @@
             </a:r>
             <a:r>
               <a:rPr lang="en-IN" sz="2400" dirty="0"/>
-              <a:t>Android is open source and Google releases the code under the Apache License. </a:t>
+              <a:t>Android is open source and Google releases the code under the Apache </a:t>
+            </a:r>
+            <a:r>
+              <a:rPr lang="en-IN" sz="2400" dirty="0" smtClean="0"/>
+              <a:t>License</a:t>
             </a:r>
             <a:endParaRPr lang="en-IN" sz="2400" dirty="0" smtClean="0"/>
           </a:p>
           <a:p>
-            <a:pPr>
+            <a:pPr algn="just">
               <a:buFont typeface="Arial" pitchFamily="34" charset="0"/>
               <a:buChar char="•"/>
             </a:pPr>
             <a:r>
               <a:rPr lang="en-IN" sz="2400" dirty="0"/>
-              <a:t>Android applications are written in java programming language</a:t>
+              <a:t>Android applications are written in java programming </a:t>
             </a:r>
             <a:r>
               <a:rPr lang="en-IN" sz="2400" dirty="0" smtClean="0"/>
-              <a:t>.</a:t>
-            </a:r>
-          </a:p>
-          <a:p>
-            <a:pPr>
+              <a:t>language</a:t>
+            </a:r>
+            <a:endParaRPr lang="en-IN" sz="2400" dirty="0" smtClean="0"/>
+          </a:p>
+          <a:p>
+            <a:pPr algn="just">
               <a:buFont typeface="Arial" pitchFamily="34" charset="0"/>
               <a:buChar char="•"/>
             </a:pPr>
@@ -13497,7 +13622,11 @@
             </a:r>
             <a:r>
               <a:rPr lang="en-IN" sz="2400" dirty="0" smtClean="0"/>
-              <a:t>play store. </a:t>
+              <a:t>play </a:t>
+            </a:r>
+            <a:r>
+              <a:rPr lang="en-IN" sz="2400" dirty="0" smtClean="0"/>
+              <a:t>store</a:t>
             </a:r>
             <a:endParaRPr lang="en-US" sz="2400" dirty="0"/>
           </a:p>
@@ -13508,6 +13637,9 @@
   <p:clrMapOvr>
     <a:masterClrMapping/>
   </p:clrMapOvr>
+  <p:transition spd="slow">
+    <p:push/>
+  </p:transition>
   <p:timing>
     <p:tnLst>
       <p:par>
@@ -13535,47 +13667,6 @@
           <a:chExt cx="0" cy="0"/>
         </a:xfrm>
       </p:grpSpPr>
-      <p:sp>
-        <p:nvSpPr>
-          <p:cNvPr id="2" name="Title 1"/>
-          <p:cNvSpPr>
-            <a:spLocks noGrp="1"/>
-          </p:cNvSpPr>
-          <p:nvPr>
-            <p:ph type="title"/>
-          </p:nvPr>
-        </p:nvSpPr>
-        <p:spPr>
-          <a:xfrm>
-            <a:off x="609600" y="4038600"/>
-            <a:ext cx="8229600" cy="1828800"/>
-          </a:xfrm>
-        </p:spPr>
-        <p:txBody>
-          <a:bodyPr>
-            <a:normAutofit/>
-          </a:bodyPr>
-          <a:lstStyle/>
-          <a:p>
-            <a:pPr algn="just">
-              <a:buFont typeface="Arial" pitchFamily="34" charset="0"/>
-              <a:buChar char="•"/>
-            </a:pPr>
-            <a:r>
-              <a:rPr lang="en-IN" sz="2400" dirty="0" smtClean="0"/>
-              <a:t>Eclipse is a multi-language Integrated development environment (IDE) comprising a base workspace and an extensible plug-in system for customizing the environment.</a:t>
-            </a:r>
-            <a:br>
-              <a:rPr lang="en-IN" sz="2400" dirty="0" smtClean="0"/>
-            </a:br>
-            <a:r>
-              <a:rPr lang="en-IN" sz="2400" dirty="0" smtClean="0"/>
-              <a:t>It is written mostly in Java.</a:t>
-            </a:r>
-            <a:endParaRPr lang="en-US" sz="2400" dirty="0"/>
-          </a:p>
-        </p:txBody>
-      </p:sp>
       <p:pic>
         <p:nvPicPr>
           <p:cNvPr id="4" name="Content Placeholder 3" descr="eclipse.jpg"/>
@@ -13594,16 +13685,84 @@
         </p:blipFill>
         <p:spPr>
           <a:xfrm>
-            <a:off x="1828800" y="1066800"/>
-            <a:ext cx="5638800" cy="2138855"/>
+            <a:off x="2743200" y="1666875"/>
+            <a:ext cx="3943350" cy="2600325"/>
           </a:xfrm>
         </p:spPr>
       </p:pic>
+      <p:sp>
+        <p:nvSpPr>
+          <p:cNvPr id="5" name="TextBox 4"/>
+          <p:cNvSpPr txBox="1"/>
+          <p:nvPr/>
+        </p:nvSpPr>
+        <p:spPr>
+          <a:xfrm>
+            <a:off x="685799" y="4495800"/>
+            <a:ext cx="7772401" cy="1569660"/>
+          </a:xfrm>
+          <a:prstGeom prst="rect">
+            <a:avLst/>
+          </a:prstGeom>
+          <a:noFill/>
+        </p:spPr>
+        <p:txBody>
+          <a:bodyPr wrap="square" rtlCol="0">
+            <a:spAutoFit/>
+          </a:bodyPr>
+          <a:lstStyle/>
+          <a:p>
+            <a:pPr algn="just"/>
+            <a:r>
+              <a:rPr lang="en-IN" sz="2400" dirty="0" smtClean="0"/>
+              <a:t>Eclipse </a:t>
+            </a:r>
+            <a:r>
+              <a:rPr lang="en-IN" sz="2400" dirty="0"/>
+              <a:t>is a multi-language Integrated development environment (IDE) comprising a base workspace and an extensible plug-in system for customizing the environment.</a:t>
+            </a:r>
+            <a:br>
+              <a:rPr lang="en-IN" sz="2400" dirty="0"/>
+            </a:br>
+            <a:r>
+              <a:rPr lang="en-IN" sz="2400" dirty="0"/>
+              <a:t>It is written mostly in Java.</a:t>
+            </a:r>
+            <a:endParaRPr lang="en-US" sz="2400" dirty="0"/>
+          </a:p>
+        </p:txBody>
+      </p:sp>
+      <p:sp>
+        <p:nvSpPr>
+          <p:cNvPr id="6" name="Title 5"/>
+          <p:cNvSpPr>
+            <a:spLocks noGrp="1"/>
+          </p:cNvSpPr>
+          <p:nvPr>
+            <p:ph type="title"/>
+          </p:nvPr>
+        </p:nvSpPr>
+        <p:spPr/>
+        <p:txBody>
+          <a:bodyPr/>
+          <a:lstStyle/>
+          <a:p>
+            <a:r>
+              <a:rPr lang="en-IN" dirty="0" smtClean="0"/>
+              <a:t>Eclipse</a:t>
+            </a:r>
+            <a:endParaRPr lang="en-IN" dirty="0"/>
+          </a:p>
+        </p:txBody>
+      </p:sp>
     </p:spTree>
   </p:cSld>
   <p:clrMapOvr>
     <a:masterClrMapping/>
   </p:clrMapOvr>
+  <p:transition spd="slow">
+    <p:push/>
+  </p:transition>
   <p:timing>
     <p:tnLst>
       <p:par>

</xml_diff>